<commit_message>
sistemazioni commenti e aggiunta valori auc ppt
</commit_message>
<xml_diff>
--- a/DMrkt_DSLab_presentation_829776_814799.pptx
+++ b/DMrkt_DSLab_presentation_829776_814799.pptx
@@ -3181,7 +3181,7 @@
           <a:p>
             <a:fld id="{3D6FC354-5D41-5F46-84EE-566149A64AB3}" type="datetimeFigureOut">
               <a:rPr lang="it-IT" smtClean="0"/>
-              <a:t>17/08/21</a:t>
+              <a:t>18/08/21</a:t>
             </a:fld>
             <a:endParaRPr lang="it-IT"/>
           </a:p>
@@ -3756,7 +3756,7 @@
           <a:p>
             <a:fld id="{3F7E5583-3B1A-EB47-95D3-30714A2ABF4C}" type="datetimeFigureOut">
               <a:rPr lang="it-IT" smtClean="0"/>
-              <a:t>17/08/21</a:t>
+              <a:t>18/08/21</a:t>
             </a:fld>
             <a:endParaRPr lang="it-IT"/>
           </a:p>
@@ -3954,7 +3954,7 @@
           <a:p>
             <a:fld id="{3F7E5583-3B1A-EB47-95D3-30714A2ABF4C}" type="datetimeFigureOut">
               <a:rPr lang="it-IT" smtClean="0"/>
-              <a:t>17/08/21</a:t>
+              <a:t>18/08/21</a:t>
             </a:fld>
             <a:endParaRPr lang="it-IT"/>
           </a:p>
@@ -4162,7 +4162,7 @@
           <a:p>
             <a:fld id="{3F7E5583-3B1A-EB47-95D3-30714A2ABF4C}" type="datetimeFigureOut">
               <a:rPr lang="it-IT" smtClean="0"/>
-              <a:t>17/08/21</a:t>
+              <a:t>18/08/21</a:t>
             </a:fld>
             <a:endParaRPr lang="it-IT"/>
           </a:p>
@@ -4360,7 +4360,7 @@
           <a:p>
             <a:fld id="{3F7E5583-3B1A-EB47-95D3-30714A2ABF4C}" type="datetimeFigureOut">
               <a:rPr lang="it-IT" smtClean="0"/>
-              <a:t>17/08/21</a:t>
+              <a:t>18/08/21</a:t>
             </a:fld>
             <a:endParaRPr lang="it-IT"/>
           </a:p>
@@ -4635,7 +4635,7 @@
           <a:p>
             <a:fld id="{3F7E5583-3B1A-EB47-95D3-30714A2ABF4C}" type="datetimeFigureOut">
               <a:rPr lang="it-IT" smtClean="0"/>
-              <a:t>17/08/21</a:t>
+              <a:t>18/08/21</a:t>
             </a:fld>
             <a:endParaRPr lang="it-IT"/>
           </a:p>
@@ -4900,7 +4900,7 @@
           <a:p>
             <a:fld id="{3F7E5583-3B1A-EB47-95D3-30714A2ABF4C}" type="datetimeFigureOut">
               <a:rPr lang="it-IT" smtClean="0"/>
-              <a:t>17/08/21</a:t>
+              <a:t>18/08/21</a:t>
             </a:fld>
             <a:endParaRPr lang="it-IT"/>
           </a:p>
@@ -5312,7 +5312,7 @@
           <a:p>
             <a:fld id="{3F7E5583-3B1A-EB47-95D3-30714A2ABF4C}" type="datetimeFigureOut">
               <a:rPr lang="it-IT" smtClean="0"/>
-              <a:t>17/08/21</a:t>
+              <a:t>18/08/21</a:t>
             </a:fld>
             <a:endParaRPr lang="it-IT"/>
           </a:p>
@@ -5453,7 +5453,7 @@
           <a:p>
             <a:fld id="{3F7E5583-3B1A-EB47-95D3-30714A2ABF4C}" type="datetimeFigureOut">
               <a:rPr lang="it-IT" smtClean="0"/>
-              <a:t>17/08/21</a:t>
+              <a:t>18/08/21</a:t>
             </a:fld>
             <a:endParaRPr lang="it-IT"/>
           </a:p>
@@ -5566,7 +5566,7 @@
           <a:p>
             <a:fld id="{3F7E5583-3B1A-EB47-95D3-30714A2ABF4C}" type="datetimeFigureOut">
               <a:rPr lang="it-IT" smtClean="0"/>
-              <a:t>17/08/21</a:t>
+              <a:t>18/08/21</a:t>
             </a:fld>
             <a:endParaRPr lang="it-IT"/>
           </a:p>
@@ -5877,7 +5877,7 @@
           <a:p>
             <a:fld id="{3F7E5583-3B1A-EB47-95D3-30714A2ABF4C}" type="datetimeFigureOut">
               <a:rPr lang="it-IT" smtClean="0"/>
-              <a:t>17/08/21</a:t>
+              <a:t>18/08/21</a:t>
             </a:fld>
             <a:endParaRPr lang="it-IT"/>
           </a:p>
@@ -6165,7 +6165,7 @@
           <a:p>
             <a:fld id="{3F7E5583-3B1A-EB47-95D3-30714A2ABF4C}" type="datetimeFigureOut">
               <a:rPr lang="it-IT" smtClean="0"/>
-              <a:t>17/08/21</a:t>
+              <a:t>18/08/21</a:t>
             </a:fld>
             <a:endParaRPr lang="it-IT"/>
           </a:p>
@@ -6406,7 +6406,7 @@
           <a:p>
             <a:fld id="{3F7E5583-3B1A-EB47-95D3-30714A2ABF4C}" type="datetimeFigureOut">
               <a:rPr lang="it-IT" smtClean="0"/>
-              <a:t>17/08/21</a:t>
+              <a:t>18/08/21</a:t>
             </a:fld>
             <a:endParaRPr lang="it-IT"/>
           </a:p>
@@ -20685,8 +20685,8 @@
         </p:nvSpPr>
         <p:spPr>
           <a:xfrm>
-            <a:off x="6372300" y="5478675"/>
-            <a:ext cx="3787418" cy="984885"/>
+            <a:off x="7290487" y="5321328"/>
+            <a:ext cx="2846202" cy="1200329"/>
           </a:xfrm>
           <a:prstGeom prst="rect">
             <a:avLst/>
@@ -20727,6 +20727,219 @@
           </a:p>
           <a:p>
             <a:endParaRPr lang="it-IT" sz="1600" dirty="0"/>
+          </a:p>
+        </p:txBody>
+      </p:sp>
+      <p:sp>
+        <p:nvSpPr>
+          <p:cNvPr id="15" name="Freccia angolare in su 14">
+            <a:extLst>
+              <a:ext uri="{FF2B5EF4-FFF2-40B4-BE49-F238E27FC236}">
+                <a16:creationId xmlns:a16="http://schemas.microsoft.com/office/drawing/2014/main" id="{C4E6D4F5-7550-FD46-92EF-8D757B311D07}"/>
+              </a:ext>
+            </a:extLst>
+          </p:cNvPr>
+          <p:cNvSpPr/>
+          <p:nvPr/>
+        </p:nvSpPr>
+        <p:spPr>
+          <a:xfrm rot="5400000">
+            <a:off x="533026" y="5065609"/>
+            <a:ext cx="742058" cy="398313"/>
+          </a:xfrm>
+          <a:prstGeom prst="bentUpArrow">
+            <a:avLst>
+              <a:gd name="adj1" fmla="val 3816"/>
+              <a:gd name="adj2" fmla="val 10171"/>
+              <a:gd name="adj3" fmla="val 25000"/>
+            </a:avLst>
+          </a:prstGeom>
+          <a:solidFill>
+            <a:schemeClr val="accent5"/>
+          </a:solidFill>
+          <a:ln>
+            <a:solidFill>
+              <a:schemeClr val="accent5"/>
+            </a:solidFill>
+          </a:ln>
+        </p:spPr>
+        <p:style>
+          <a:lnRef idx="2">
+            <a:schemeClr val="accent1">
+              <a:shade val="50000"/>
+            </a:schemeClr>
+          </a:lnRef>
+          <a:fillRef idx="1">
+            <a:schemeClr val="accent1"/>
+          </a:fillRef>
+          <a:effectRef idx="0">
+            <a:schemeClr val="accent1"/>
+          </a:effectRef>
+          <a:fontRef idx="minor">
+            <a:schemeClr val="lt1"/>
+          </a:fontRef>
+        </p:style>
+        <p:txBody>
+          <a:bodyPr rtlCol="0" anchor="ctr"/>
+          <a:lstStyle/>
+          <a:p>
+            <a:pPr algn="ctr"/>
+            <a:endParaRPr lang="it-IT"/>
+          </a:p>
+        </p:txBody>
+      </p:sp>
+      <p:sp>
+        <p:nvSpPr>
+          <p:cNvPr id="4" name="Rettangolo 3">
+            <a:extLst>
+              <a:ext uri="{FF2B5EF4-FFF2-40B4-BE49-F238E27FC236}">
+                <a16:creationId xmlns:a16="http://schemas.microsoft.com/office/drawing/2014/main" id="{89CA00EF-3E0E-E046-BEEC-9A8939BD0898}"/>
+              </a:ext>
+            </a:extLst>
+          </p:cNvPr>
+          <p:cNvSpPr/>
+          <p:nvPr/>
+        </p:nvSpPr>
+        <p:spPr>
+          <a:xfrm>
+            <a:off x="1154741" y="5244383"/>
+            <a:ext cx="4500129" cy="1107996"/>
+          </a:xfrm>
+          <a:prstGeom prst="rect">
+            <a:avLst/>
+          </a:prstGeom>
+        </p:spPr>
+        <p:txBody>
+          <a:bodyPr wrap="square">
+            <a:spAutoFit/>
+          </a:bodyPr>
+          <a:lstStyle/>
+          <a:p>
+            <a:r>
+              <a:rPr lang="it-IT" sz="1100" b="1" dirty="0">
+                <a:latin typeface="Century Gothic" panose="020B0502020202020204" pitchFamily="34" charset="0"/>
+              </a:rPr>
+              <a:t>Modello                   		Area Under Curve</a:t>
+            </a:r>
+          </a:p>
+          <a:p>
+            <a:r>
+              <a:rPr lang="it-IT" sz="1100" dirty="0">
+                <a:latin typeface="Century Gothic" panose="020B0502020202020204" pitchFamily="34" charset="0"/>
+              </a:rPr>
+              <a:t>Decision Tree        		0.6824019</a:t>
+            </a:r>
+          </a:p>
+          <a:p>
+            <a:r>
+              <a:rPr lang="it-IT" sz="1100" dirty="0">
+                <a:latin typeface="Century Gothic" panose="020B0502020202020204" pitchFamily="34" charset="0"/>
+              </a:rPr>
+              <a:t>Random Forest        		0.7386719</a:t>
+            </a:r>
+          </a:p>
+          <a:p>
+            <a:r>
+              <a:rPr lang="it-IT" sz="1100" dirty="0">
+                <a:latin typeface="Century Gothic" panose="020B0502020202020204" pitchFamily="34" charset="0"/>
+              </a:rPr>
+              <a:t>Logistic Regression  		0.7461111</a:t>
+            </a:r>
+          </a:p>
+          <a:p>
+            <a:r>
+              <a:rPr lang="it-IT" sz="1100" dirty="0">
+                <a:latin typeface="Century Gothic" panose="020B0502020202020204" pitchFamily="34" charset="0"/>
+              </a:rPr>
+              <a:t>Neural Network Model 		0.7462316</a:t>
+            </a:r>
+          </a:p>
+          <a:p>
+            <a:r>
+              <a:rPr lang="it-IT" sz="1100" dirty="0">
+                <a:latin typeface="Century Gothic" panose="020B0502020202020204" pitchFamily="34" charset="0"/>
+              </a:rPr>
+              <a:t>Naive Bayes          		0.7339499</a:t>
+            </a:r>
+          </a:p>
+        </p:txBody>
+      </p:sp>
+      <p:sp>
+        <p:nvSpPr>
+          <p:cNvPr id="19" name="Google Shape;934;p62">
+            <a:extLst>
+              <a:ext uri="{FF2B5EF4-FFF2-40B4-BE49-F238E27FC236}">
+                <a16:creationId xmlns:a16="http://schemas.microsoft.com/office/drawing/2014/main" id="{970C9122-D18E-0342-B08E-A02EB42AC509}"/>
+              </a:ext>
+            </a:extLst>
+          </p:cNvPr>
+          <p:cNvSpPr/>
+          <p:nvPr/>
+        </p:nvSpPr>
+        <p:spPr>
+          <a:xfrm rot="10800000">
+            <a:off x="4711303" y="5989107"/>
+            <a:ext cx="193652" cy="139934"/>
+          </a:xfrm>
+          <a:custGeom>
+            <a:avLst/>
+            <a:gdLst/>
+            <a:ahLst/>
+            <a:cxnLst/>
+            <a:rect l="l" t="t" r="r" b="b"/>
+            <a:pathLst>
+              <a:path w="3008" h="2157" extrusionOk="0">
+                <a:moveTo>
+                  <a:pt x="0" y="0"/>
+                </a:moveTo>
+                <a:lnTo>
+                  <a:pt x="729" y="1075"/>
+                </a:lnTo>
+                <a:lnTo>
+                  <a:pt x="0" y="2157"/>
+                </a:lnTo>
+                <a:lnTo>
+                  <a:pt x="0" y="2157"/>
+                </a:lnTo>
+                <a:lnTo>
+                  <a:pt x="3008" y="1075"/>
+                </a:lnTo>
+                <a:lnTo>
+                  <a:pt x="0" y="0"/>
+                </a:lnTo>
+                <a:close/>
+              </a:path>
+            </a:pathLst>
+          </a:custGeom>
+          <a:solidFill>
+            <a:schemeClr val="accent5"/>
+          </a:solidFill>
+          <a:ln w="9525" cap="flat" cmpd="sng">
+            <a:solidFill>
+              <a:srgbClr val="869FB2"/>
+            </a:solidFill>
+            <a:prstDash val="solid"/>
+            <a:round/>
+            <a:headEnd type="none" w="sm" len="sm"/>
+            <a:tailEnd type="none" w="sm" len="sm"/>
+          </a:ln>
+        </p:spPr>
+        <p:txBody>
+          <a:bodyPr spcFirstLastPara="1" wrap="square" lIns="91425" tIns="91425" rIns="91425" bIns="91425" anchor="ctr" anchorCtr="0">
+            <a:noAutofit/>
+          </a:bodyPr>
+          <a:lstStyle/>
+          <a:p>
+            <a:pPr marL="0" lvl="0" indent="0" algn="l" rtl="0">
+              <a:spcBef>
+                <a:spcPts val="0"/>
+              </a:spcBef>
+              <a:spcAft>
+                <a:spcPts val="0"/>
+              </a:spcAft>
+              <a:buNone/>
+            </a:pPr>
+            <a:endParaRPr/>
           </a:p>
         </p:txBody>
       </p:sp>

</xml_diff>

<commit_message>
correzione parole ppt e pdf
</commit_message>
<xml_diff>
--- a/DMrkt_DSLab_presentation_829776_814799.pptx
+++ b/DMrkt_DSLab_presentation_829776_814799.pptx
@@ -19372,7 +19372,7 @@
         <p:spPr>
           <a:xfrm>
             <a:off x="5528043" y="1966770"/>
-            <a:ext cx="2784144" cy="3754874"/>
+            <a:ext cx="2784144" cy="3539430"/>
           </a:xfrm>
           <a:prstGeom prst="rect">
             <a:avLst/>
@@ -19456,7 +19456,7 @@
               <a:buChar char="§"/>
             </a:pPr>
             <a:r>
-              <a:rPr lang="it-IT" sz="1400" dirty="0">
+              <a:rPr lang="it-IT" sz="1400" dirty="0" err="1">
                 <a:solidFill>
                   <a:schemeClr val="tx1">
                     <a:lumMod val="65000"/>
@@ -19465,8 +19465,17 @@
                 </a:solidFill>
                 <a:latin typeface="Century Gothic" panose="020B0502020202020204" pitchFamily="34" charset="0"/>
               </a:rPr>
-              <a:t>Recency</a:t>
+              <a:t>recency</a:t>
             </a:r>
+            <a:endParaRPr lang="it-IT" sz="1400" dirty="0">
+              <a:solidFill>
+                <a:schemeClr val="tx1">
+                  <a:lumMod val="65000"/>
+                  <a:lumOff val="35000"/>
+                </a:schemeClr>
+              </a:solidFill>
+              <a:latin typeface="Century Gothic" panose="020B0502020202020204" pitchFamily="34" charset="0"/>
+            </a:endParaRPr>
           </a:p>
           <a:p>
             <a:pPr marL="285750" indent="-285750">
@@ -19531,7 +19540,7 @@
                 </a:solidFill>
                 <a:latin typeface="Century Gothic" panose="020B0502020202020204" pitchFamily="34" charset="0"/>
               </a:rPr>
-              <a:t>il tipo di programma fedeltà a cui è iscritto il cliente</a:t>
+              <a:t>tipo di programma fedeltà a cui è iscritto il cliente</a:t>
             </a:r>
           </a:p>
           <a:p>
@@ -19597,7 +19606,7 @@
                 </a:solidFill>
                 <a:latin typeface="Century Gothic" panose="020B0502020202020204" pitchFamily="34" charset="0"/>
               </a:rPr>
-              <a:t>Identificativo del reference store</a:t>
+              <a:t>identificativo del reference store</a:t>
             </a:r>
           </a:p>
         </p:txBody>

</xml_diff>

<commit_message>
sistemazione formattazione ppt e pdf
</commit_message>
<xml_diff>
--- a/DMrkt_DSLab_presentation_829776_814799.pptx
+++ b/DMrkt_DSLab_presentation_829776_814799.pptx
@@ -9260,7 +9260,7 @@
           <p:nvPr>
             <p:extLst>
               <p:ext uri="{D42A27DB-BD31-4B8C-83A1-F6EECF244321}">
-                <p14:modId xmlns:p14="http://schemas.microsoft.com/office/powerpoint/2010/main" val="214106968"/>
+                <p14:modId xmlns:p14="http://schemas.microsoft.com/office/powerpoint/2010/main" val="1237057015"/>
               </p:ext>
             </p:extLst>
           </p:nvPr>
@@ -9304,6 +9304,7 @@
                     <a:bodyPr/>
                     <a:lstStyle/>
                     <a:p>
+                      <a:pPr algn="l"/>
                       <a:r>
                         <a:rPr lang="it-IT" dirty="0">
                           <a:solidFill>
@@ -9320,13 +9321,14 @@
                       </a:endParaRPr>
                     </a:p>
                   </a:txBody>
-                  <a:tcPr/>
+                  <a:tcPr anchor="ctr"/>
                 </a:tc>
                 <a:tc>
                   <a:txBody>
                     <a:bodyPr/>
                     <a:lstStyle/>
                     <a:p>
+                      <a:pPr algn="l"/>
                       <a:r>
                         <a:rPr lang="it-IT" dirty="0">
                           <a:solidFill>
@@ -9343,13 +9345,14 @@
                       </a:endParaRPr>
                     </a:p>
                   </a:txBody>
-                  <a:tcPr/>
+                  <a:tcPr anchor="ctr"/>
                 </a:tc>
                 <a:tc>
                   <a:txBody>
                     <a:bodyPr/>
                     <a:lstStyle/>
                     <a:p>
+                      <a:pPr algn="l"/>
                       <a:r>
                         <a:rPr lang="it-IT" dirty="0">
                           <a:solidFill>
@@ -9366,7 +9369,7 @@
                       </a:endParaRPr>
                     </a:p>
                   </a:txBody>
-                  <a:tcPr/>
+                  <a:tcPr anchor="ctr"/>
                 </a:tc>
                 <a:extLst>
                   <a:ext uri="{0D108BD9-81ED-4DB2-BD59-A6C34878D82A}">

</xml_diff>